<commit_message>
presentation and read me
</commit_message>
<xml_diff>
--- a/Life Expectancy Analysis.pptx
+++ b/Life Expectancy Analysis.pptx
@@ -206,7 +206,7 @@
           <a:p>
             <a:fld id="{B949E505-9738-48A8-9AEE-EE8AE539CA9C}" type="datetimeFigureOut">
               <a:rPr lang="en-US" smtClean="0"/>
-              <a:t>10/18/2019</a:t>
+              <a:t>10/19/2019</a:t>
             </a:fld>
             <a:endParaRPr lang="en-US"/>
           </a:p>
@@ -872,7 +872,7 @@
           <a:p>
             <a:fld id="{ECCAD562-A3C5-438A-80F4-13229901F156}" type="datetimeFigureOut">
               <a:rPr lang="en-US" smtClean="0"/>
-              <a:t>10/18/2019</a:t>
+              <a:t>10/19/2019</a:t>
             </a:fld>
             <a:endParaRPr lang="en-US"/>
           </a:p>
@@ -1070,7 +1070,7 @@
           <a:p>
             <a:fld id="{ECCAD562-A3C5-438A-80F4-13229901F156}" type="datetimeFigureOut">
               <a:rPr lang="en-US" smtClean="0"/>
-              <a:t>10/18/2019</a:t>
+              <a:t>10/19/2019</a:t>
             </a:fld>
             <a:endParaRPr lang="en-US"/>
           </a:p>
@@ -1278,7 +1278,7 @@
           <a:p>
             <a:fld id="{ECCAD562-A3C5-438A-80F4-13229901F156}" type="datetimeFigureOut">
               <a:rPr lang="en-US" smtClean="0"/>
-              <a:t>10/18/2019</a:t>
+              <a:t>10/19/2019</a:t>
             </a:fld>
             <a:endParaRPr lang="en-US"/>
           </a:p>
@@ -1476,7 +1476,7 @@
           <a:p>
             <a:fld id="{ECCAD562-A3C5-438A-80F4-13229901F156}" type="datetimeFigureOut">
               <a:rPr lang="en-US" smtClean="0"/>
-              <a:t>10/18/2019</a:t>
+              <a:t>10/19/2019</a:t>
             </a:fld>
             <a:endParaRPr lang="en-US"/>
           </a:p>
@@ -1751,7 +1751,7 @@
           <a:p>
             <a:fld id="{ECCAD562-A3C5-438A-80F4-13229901F156}" type="datetimeFigureOut">
               <a:rPr lang="en-US" smtClean="0"/>
-              <a:t>10/18/2019</a:t>
+              <a:t>10/19/2019</a:t>
             </a:fld>
             <a:endParaRPr lang="en-US"/>
           </a:p>
@@ -2016,7 +2016,7 @@
           <a:p>
             <a:fld id="{ECCAD562-A3C5-438A-80F4-13229901F156}" type="datetimeFigureOut">
               <a:rPr lang="en-US" smtClean="0"/>
-              <a:t>10/18/2019</a:t>
+              <a:t>10/19/2019</a:t>
             </a:fld>
             <a:endParaRPr lang="en-US"/>
           </a:p>
@@ -2428,7 +2428,7 @@
           <a:p>
             <a:fld id="{ECCAD562-A3C5-438A-80F4-13229901F156}" type="datetimeFigureOut">
               <a:rPr lang="en-US" smtClean="0"/>
-              <a:t>10/18/2019</a:t>
+              <a:t>10/19/2019</a:t>
             </a:fld>
             <a:endParaRPr lang="en-US"/>
           </a:p>
@@ -2569,7 +2569,7 @@
           <a:p>
             <a:fld id="{ECCAD562-A3C5-438A-80F4-13229901F156}" type="datetimeFigureOut">
               <a:rPr lang="en-US" smtClean="0"/>
-              <a:t>10/18/2019</a:t>
+              <a:t>10/19/2019</a:t>
             </a:fld>
             <a:endParaRPr lang="en-US"/>
           </a:p>
@@ -2682,7 +2682,7 @@
           <a:p>
             <a:fld id="{ECCAD562-A3C5-438A-80F4-13229901F156}" type="datetimeFigureOut">
               <a:rPr lang="en-US" smtClean="0"/>
-              <a:t>10/18/2019</a:t>
+              <a:t>10/19/2019</a:t>
             </a:fld>
             <a:endParaRPr lang="en-US"/>
           </a:p>
@@ -2993,7 +2993,7 @@
           <a:p>
             <a:fld id="{ECCAD562-A3C5-438A-80F4-13229901F156}" type="datetimeFigureOut">
               <a:rPr lang="en-US" smtClean="0"/>
-              <a:t>10/18/2019</a:t>
+              <a:t>10/19/2019</a:t>
             </a:fld>
             <a:endParaRPr lang="en-US"/>
           </a:p>
@@ -3281,7 +3281,7 @@
           <a:p>
             <a:fld id="{ECCAD562-A3C5-438A-80F4-13229901F156}" type="datetimeFigureOut">
               <a:rPr lang="en-US" smtClean="0"/>
-              <a:t>10/18/2019</a:t>
+              <a:t>10/19/2019</a:t>
             </a:fld>
             <a:endParaRPr lang="en-US"/>
           </a:p>
@@ -3522,7 +3522,7 @@
           <a:p>
             <a:fld id="{ECCAD562-A3C5-438A-80F4-13229901F156}" type="datetimeFigureOut">
               <a:rPr lang="en-US" smtClean="0"/>
-              <a:t>10/18/2019</a:t>
+              <a:t>10/19/2019</a:t>
             </a:fld>
             <a:endParaRPr lang="en-US"/>
           </a:p>
@@ -5670,886 +5670,6 @@
           <a:chExt cx="0" cy="0"/>
         </a:xfrm>
       </p:grpSpPr>
-      <p:graphicFrame>
-        <p:nvGraphicFramePr>
-          <p:cNvPr id="8" name="Content Placeholder 7">
-            <a:extLst>
-              <a:ext uri="{FF2B5EF4-FFF2-40B4-BE49-F238E27FC236}">
-                <a16:creationId xmlns:a16="http://schemas.microsoft.com/office/drawing/2014/main" id="{23E02A45-B59B-4E51-A517-8F50C4E4C389}"/>
-              </a:ext>
-            </a:extLst>
-          </p:cNvPr>
-          <p:cNvGraphicFramePr>
-            <a:graphicFrameLocks noGrp="1"/>
-          </p:cNvGraphicFramePr>
-          <p:nvPr>
-            <p:ph idx="1"/>
-            <p:extLst>
-              <p:ext uri="{D42A27DB-BD31-4B8C-83A1-F6EECF244321}">
-                <p14:modId xmlns:p14="http://schemas.microsoft.com/office/powerpoint/2010/main" val="4034714939"/>
-              </p:ext>
-            </p:extLst>
-          </p:nvPr>
-        </p:nvGraphicFramePr>
-        <p:xfrm>
-          <a:off x="6898640" y="1727200"/>
-          <a:ext cx="4673867" cy="3606800"/>
-        </p:xfrm>
-        <a:graphic>
-          <a:graphicData uri="http://schemas.openxmlformats.org/drawingml/2006/table">
-            <a:tbl>
-              <a:tblPr firstRow="1" bandRow="1">
-                <a:tableStyleId>{C083E6E3-FA7D-4D7B-A595-EF9225AFEA82}</a:tableStyleId>
-              </a:tblPr>
-              <a:tblGrid>
-                <a:gridCol w="2133600">
-                  <a:extLst>
-                    <a:ext uri="{9D8B030D-6E8A-4147-A177-3AD203B41FA5}">
-                      <a16:colId xmlns:a16="http://schemas.microsoft.com/office/drawing/2014/main" val="1797525430"/>
-                    </a:ext>
-                  </a:extLst>
-                </a:gridCol>
-                <a:gridCol w="2540267">
-                  <a:extLst>
-                    <a:ext uri="{9D8B030D-6E8A-4147-A177-3AD203B41FA5}">
-                      <a16:colId xmlns:a16="http://schemas.microsoft.com/office/drawing/2014/main" val="968075426"/>
-                    </a:ext>
-                  </a:extLst>
-                </a:gridCol>
-              </a:tblGrid>
-              <a:tr h="497840">
-                <a:tc>
-                  <a:txBody>
-                    <a:bodyPr/>
-                    <a:lstStyle/>
-                    <a:p>
-                      <a:pPr marL="0" indent="0" algn="r">
-                        <a:buFont typeface="Wingdings" panose="05000000000000000000" pitchFamily="2" charset="2"/>
-                        <a:buNone/>
-                      </a:pPr>
-                      <a:r>
-                        <a:rPr lang="en-US" sz="2000" b="1" dirty="0">
-                          <a:solidFill>
-                            <a:schemeClr val="tx1"/>
-                          </a:solidFill>
-                        </a:rPr>
-                        <a:t>   SYSTEM</a:t>
-                      </a:r>
-                    </a:p>
-                  </a:txBody>
-                  <a:tcPr>
-                    <a:lnL w="12700" cap="flat" cmpd="sng" algn="ctr">
-                      <a:solidFill>
-                        <a:schemeClr val="tx1"/>
-                      </a:solidFill>
-                      <a:prstDash val="solid"/>
-                      <a:round/>
-                      <a:headEnd type="none" w="med" len="med"/>
-                      <a:tailEnd type="none" w="med" len="med"/>
-                    </a:lnL>
-                    <a:lnT w="12700" cap="flat" cmpd="sng" algn="ctr">
-                      <a:solidFill>
-                        <a:schemeClr val="tx1"/>
-                      </a:solidFill>
-                      <a:prstDash val="solid"/>
-                      <a:round/>
-                      <a:headEnd type="none" w="med" len="med"/>
-                      <a:tailEnd type="none" w="med" len="med"/>
-                    </a:lnT>
-                  </a:tcPr>
-                </a:tc>
-                <a:tc>
-                  <a:txBody>
-                    <a:bodyPr/>
-                    <a:lstStyle/>
-                    <a:p>
-                      <a:pPr marL="0" marR="0" lvl="0" indent="0" algn="l" defTabSz="914400" rtl="0" eaLnBrk="1" fontAlgn="auto" latinLnBrk="0" hangingPunct="1">
-                        <a:lnSpc>
-                          <a:spcPct val="100000"/>
-                        </a:lnSpc>
-                        <a:spcBef>
-                          <a:spcPts val="0"/>
-                        </a:spcBef>
-                        <a:spcAft>
-                          <a:spcPts val="0"/>
-                        </a:spcAft>
-                        <a:buClrTx/>
-                        <a:buSzTx/>
-                        <a:buFont typeface="Wingdings" panose="05000000000000000000" pitchFamily="2" charset="2"/>
-                        <a:buNone/>
-                        <a:tabLst/>
-                        <a:defRPr/>
-                      </a:pPr>
-                      <a:r>
-                        <a:rPr lang="en-US" sz="2000" b="1" dirty="0">
-                          <a:solidFill>
-                            <a:schemeClr val="tx1"/>
-                          </a:solidFill>
-                        </a:rPr>
-                        <a:t>STRUCTURE</a:t>
-                      </a:r>
-                    </a:p>
-                  </a:txBody>
-                  <a:tcPr>
-                    <a:lnR w="12700" cap="flat" cmpd="sng" algn="ctr">
-                      <a:solidFill>
-                        <a:schemeClr val="tx1"/>
-                      </a:solidFill>
-                      <a:prstDash val="solid"/>
-                      <a:round/>
-                      <a:headEnd type="none" w="med" len="med"/>
-                      <a:tailEnd type="none" w="med" len="med"/>
-                    </a:lnR>
-                    <a:lnT w="12700" cap="flat" cmpd="sng" algn="ctr">
-                      <a:solidFill>
-                        <a:schemeClr val="tx1"/>
-                      </a:solidFill>
-                      <a:prstDash val="solid"/>
-                      <a:round/>
-                      <a:headEnd type="none" w="med" len="med"/>
-                      <a:tailEnd type="none" w="med" len="med"/>
-                    </a:lnT>
-                  </a:tcPr>
-                </a:tc>
-                <a:extLst>
-                  <a:ext uri="{0D108BD9-81ED-4DB2-BD59-A6C34878D82A}">
-                    <a16:rowId xmlns:a16="http://schemas.microsoft.com/office/drawing/2014/main" val="1215835824"/>
-                  </a:ext>
-                </a:extLst>
-              </a:tr>
-              <a:tr h="436880">
-                <a:tc>
-                  <a:txBody>
-                    <a:bodyPr/>
-                    <a:lstStyle/>
-                    <a:p>
-                      <a:pPr marL="0" marR="0" lvl="0" indent="0" algn="l" defTabSz="914400" rtl="0" eaLnBrk="1" fontAlgn="auto" latinLnBrk="0" hangingPunct="1">
-                        <a:lnSpc>
-                          <a:spcPct val="100000"/>
-                        </a:lnSpc>
-                        <a:spcBef>
-                          <a:spcPts val="0"/>
-                        </a:spcBef>
-                        <a:spcAft>
-                          <a:spcPts val="0"/>
-                        </a:spcAft>
-                        <a:buClrTx/>
-                        <a:buSzTx/>
-                        <a:buFont typeface="Wingdings" panose="05000000000000000000" pitchFamily="2" charset="2"/>
-                        <a:buChar char="§"/>
-                        <a:tabLst/>
-                        <a:defRPr/>
-                      </a:pPr>
-                      <a:r>
-                        <a:rPr lang="en-US" sz="2000" b="0" dirty="0">
-                          <a:solidFill>
-                            <a:schemeClr val="tx1"/>
-                          </a:solidFill>
-                        </a:rPr>
-                        <a:t>  </a:t>
-                      </a:r>
-                      <a:r>
-                        <a:rPr lang="en-US" sz="2000" b="0" dirty="0"/>
-                        <a:t>D3</a:t>
-                      </a:r>
-                      <a:endParaRPr lang="en-US" sz="2000" b="0" dirty="0">
-                        <a:solidFill>
-                          <a:schemeClr val="tx1"/>
-                        </a:solidFill>
-                      </a:endParaRPr>
-                    </a:p>
-                  </a:txBody>
-                  <a:tcPr>
-                    <a:lnL w="12700" cap="flat" cmpd="sng" algn="ctr">
-                      <a:solidFill>
-                        <a:schemeClr val="tx1"/>
-                      </a:solidFill>
-                      <a:prstDash val="solid"/>
-                      <a:round/>
-                      <a:headEnd type="none" w="med" len="med"/>
-                      <a:tailEnd type="none" w="med" len="med"/>
-                    </a:lnL>
-                  </a:tcPr>
-                </a:tc>
-                <a:tc>
-                  <a:txBody>
-                    <a:bodyPr/>
-                    <a:lstStyle/>
-                    <a:p>
-                      <a:pPr marL="0" marR="0" lvl="0" indent="0" algn="l" defTabSz="914400" rtl="0" eaLnBrk="1" fontAlgn="auto" latinLnBrk="0" hangingPunct="1">
-                        <a:lnSpc>
-                          <a:spcPct val="100000"/>
-                        </a:lnSpc>
-                        <a:spcBef>
-                          <a:spcPts val="0"/>
-                        </a:spcBef>
-                        <a:spcAft>
-                          <a:spcPts val="0"/>
-                        </a:spcAft>
-                        <a:buClrTx/>
-                        <a:buSzTx/>
-                        <a:buFont typeface="Wingdings" panose="05000000000000000000" pitchFamily="2" charset="2"/>
-                        <a:buChar char="§"/>
-                        <a:tabLst/>
-                        <a:defRPr/>
-                      </a:pPr>
-                      <a:r>
-                        <a:rPr lang="en-US" sz="2000" b="0" dirty="0">
-                          <a:solidFill>
-                            <a:schemeClr val="tx1"/>
-                          </a:solidFill>
-                        </a:rPr>
-                        <a:t>  </a:t>
-                      </a:r>
-                      <a:r>
-                        <a:rPr lang="en-US" sz="2000" b="0" dirty="0"/>
-                        <a:t>Bootstrap</a:t>
-                      </a:r>
-                      <a:endParaRPr lang="en-US" sz="2000" b="0" dirty="0">
-                        <a:solidFill>
-                          <a:schemeClr val="tx1"/>
-                        </a:solidFill>
-                      </a:endParaRPr>
-                    </a:p>
-                  </a:txBody>
-                  <a:tcPr>
-                    <a:lnR w="12700" cap="flat" cmpd="sng" algn="ctr">
-                      <a:solidFill>
-                        <a:schemeClr val="tx1"/>
-                      </a:solidFill>
-                      <a:prstDash val="solid"/>
-                      <a:round/>
-                      <a:headEnd type="none" w="med" len="med"/>
-                      <a:tailEnd type="none" w="med" len="med"/>
-                    </a:lnR>
-                  </a:tcPr>
-                </a:tc>
-                <a:extLst>
-                  <a:ext uri="{0D108BD9-81ED-4DB2-BD59-A6C34878D82A}">
-                    <a16:rowId xmlns:a16="http://schemas.microsoft.com/office/drawing/2014/main" val="3236311538"/>
-                  </a:ext>
-                </a:extLst>
-              </a:tr>
-              <a:tr h="518160">
-                <a:tc>
-                  <a:txBody>
-                    <a:bodyPr/>
-                    <a:lstStyle/>
-                    <a:p>
-                      <a:pPr marL="0" marR="0" lvl="0" indent="0" algn="l" defTabSz="914400" rtl="0" eaLnBrk="1" fontAlgn="auto" latinLnBrk="0" hangingPunct="1">
-                        <a:lnSpc>
-                          <a:spcPct val="100000"/>
-                        </a:lnSpc>
-                        <a:spcBef>
-                          <a:spcPts val="0"/>
-                        </a:spcBef>
-                        <a:spcAft>
-                          <a:spcPts val="0"/>
-                        </a:spcAft>
-                        <a:buClrTx/>
-                        <a:buSzTx/>
-                        <a:buFont typeface="Wingdings" panose="05000000000000000000" pitchFamily="2" charset="2"/>
-                        <a:buChar char="§"/>
-                        <a:tabLst/>
-                        <a:defRPr/>
-                      </a:pPr>
-                      <a:r>
-                        <a:rPr lang="en-US" sz="2000" b="0" dirty="0">
-                          <a:solidFill>
-                            <a:schemeClr val="tx1"/>
-                          </a:solidFill>
-                        </a:rPr>
-                        <a:t>  </a:t>
-                      </a:r>
-                      <a:r>
-                        <a:rPr lang="en-US" sz="2000" b="0" dirty="0"/>
-                        <a:t>jQuery</a:t>
-                      </a:r>
-                      <a:endParaRPr lang="en-US" sz="2000" b="0" dirty="0">
-                        <a:solidFill>
-                          <a:schemeClr val="tx1"/>
-                        </a:solidFill>
-                      </a:endParaRPr>
-                    </a:p>
-                  </a:txBody>
-                  <a:tcPr>
-                    <a:lnL w="12700" cap="flat" cmpd="sng" algn="ctr">
-                      <a:solidFill>
-                        <a:schemeClr val="tx1"/>
-                      </a:solidFill>
-                      <a:prstDash val="solid"/>
-                      <a:round/>
-                      <a:headEnd type="none" w="med" len="med"/>
-                      <a:tailEnd type="none" w="med" len="med"/>
-                    </a:lnL>
-                  </a:tcPr>
-                </a:tc>
-                <a:tc>
-                  <a:txBody>
-                    <a:bodyPr/>
-                    <a:lstStyle/>
-                    <a:p>
-                      <a:pPr marL="0" marR="0" lvl="0" indent="0" algn="l" defTabSz="914400" rtl="0" eaLnBrk="1" fontAlgn="auto" latinLnBrk="0" hangingPunct="1">
-                        <a:lnSpc>
-                          <a:spcPct val="100000"/>
-                        </a:lnSpc>
-                        <a:spcBef>
-                          <a:spcPts val="0"/>
-                        </a:spcBef>
-                        <a:spcAft>
-                          <a:spcPts val="0"/>
-                        </a:spcAft>
-                        <a:buClrTx/>
-                        <a:buSzTx/>
-                        <a:buFont typeface="Wingdings" panose="05000000000000000000" pitchFamily="2" charset="2"/>
-                        <a:buChar char="§"/>
-                        <a:tabLst/>
-                        <a:defRPr/>
-                      </a:pPr>
-                      <a:r>
-                        <a:rPr lang="en-US" sz="2000" b="0" dirty="0">
-                          <a:solidFill>
-                            <a:schemeClr val="tx1"/>
-                          </a:solidFill>
-                        </a:rPr>
-                        <a:t>  </a:t>
-                      </a:r>
-                      <a:r>
-                        <a:rPr lang="en-US" sz="2000" b="0" dirty="0"/>
-                        <a:t>HTML </a:t>
-                      </a:r>
-                      <a:endParaRPr lang="en-US" sz="2000" b="0" dirty="0">
-                        <a:solidFill>
-                          <a:schemeClr val="tx1"/>
-                        </a:solidFill>
-                      </a:endParaRPr>
-                    </a:p>
-                  </a:txBody>
-                  <a:tcPr>
-                    <a:lnR w="12700" cap="flat" cmpd="sng" algn="ctr">
-                      <a:solidFill>
-                        <a:schemeClr val="tx1"/>
-                      </a:solidFill>
-                      <a:prstDash val="solid"/>
-                      <a:round/>
-                      <a:headEnd type="none" w="med" len="med"/>
-                      <a:tailEnd type="none" w="med" len="med"/>
-                    </a:lnR>
-                  </a:tcPr>
-                </a:tc>
-                <a:extLst>
-                  <a:ext uri="{0D108BD9-81ED-4DB2-BD59-A6C34878D82A}">
-                    <a16:rowId xmlns:a16="http://schemas.microsoft.com/office/drawing/2014/main" val="3906549339"/>
-                  </a:ext>
-                </a:extLst>
-              </a:tr>
-              <a:tr h="538480">
-                <a:tc>
-                  <a:txBody>
-                    <a:bodyPr/>
-                    <a:lstStyle/>
-                    <a:p>
-                      <a:pPr marL="0" marR="0" lvl="0" indent="0" algn="l" defTabSz="914400" rtl="0" eaLnBrk="1" fontAlgn="auto" latinLnBrk="0" hangingPunct="1">
-                        <a:lnSpc>
-                          <a:spcPct val="100000"/>
-                        </a:lnSpc>
-                        <a:spcBef>
-                          <a:spcPts val="0"/>
-                        </a:spcBef>
-                        <a:spcAft>
-                          <a:spcPts val="0"/>
-                        </a:spcAft>
-                        <a:buClrTx/>
-                        <a:buSzTx/>
-                        <a:buFont typeface="Wingdings" panose="05000000000000000000" pitchFamily="2" charset="2"/>
-                        <a:buChar char="§"/>
-                        <a:tabLst/>
-                        <a:defRPr/>
-                      </a:pPr>
-                      <a:r>
-                        <a:rPr lang="en-US" sz="2000" b="0" dirty="0"/>
-                        <a:t>   Leaflet</a:t>
-                      </a:r>
-                      <a:endParaRPr lang="en-US" sz="2000" b="0" dirty="0">
-                        <a:solidFill>
-                          <a:schemeClr val="tx1"/>
-                        </a:solidFill>
-                      </a:endParaRPr>
-                    </a:p>
-                  </a:txBody>
-                  <a:tcPr>
-                    <a:lnL w="12700" cap="flat" cmpd="sng" algn="ctr">
-                      <a:solidFill>
-                        <a:schemeClr val="tx1"/>
-                      </a:solidFill>
-                      <a:prstDash val="solid"/>
-                      <a:round/>
-                      <a:headEnd type="none" w="med" len="med"/>
-                      <a:tailEnd type="none" w="med" len="med"/>
-                    </a:lnL>
-                  </a:tcPr>
-                </a:tc>
-                <a:tc>
-                  <a:txBody>
-                    <a:bodyPr/>
-                    <a:lstStyle/>
-                    <a:p>
-                      <a:pPr marL="0" marR="0" lvl="0" indent="0" algn="l" defTabSz="914400" rtl="0" eaLnBrk="1" fontAlgn="auto" latinLnBrk="0" hangingPunct="1">
-                        <a:lnSpc>
-                          <a:spcPct val="100000"/>
-                        </a:lnSpc>
-                        <a:spcBef>
-                          <a:spcPts val="0"/>
-                        </a:spcBef>
-                        <a:spcAft>
-                          <a:spcPts val="0"/>
-                        </a:spcAft>
-                        <a:buClrTx/>
-                        <a:buSzTx/>
-                        <a:buFont typeface="Wingdings" panose="05000000000000000000" pitchFamily="2" charset="2"/>
-                        <a:buChar char="§"/>
-                        <a:tabLst/>
-                        <a:defRPr/>
-                      </a:pPr>
-                      <a:r>
-                        <a:rPr lang="en-US" sz="2000" b="0" dirty="0"/>
-                        <a:t>   Flask</a:t>
-                      </a:r>
-                      <a:endParaRPr lang="en-US" sz="2000" b="0" dirty="0">
-                        <a:solidFill>
-                          <a:schemeClr val="tx1"/>
-                        </a:solidFill>
-                      </a:endParaRPr>
-                    </a:p>
-                  </a:txBody>
-                  <a:tcPr>
-                    <a:lnR w="12700" cap="flat" cmpd="sng" algn="ctr">
-                      <a:solidFill>
-                        <a:schemeClr val="tx1"/>
-                      </a:solidFill>
-                      <a:prstDash val="solid"/>
-                      <a:round/>
-                      <a:headEnd type="none" w="med" len="med"/>
-                      <a:tailEnd type="none" w="med" len="med"/>
-                    </a:lnR>
-                  </a:tcPr>
-                </a:tc>
-                <a:extLst>
-                  <a:ext uri="{0D108BD9-81ED-4DB2-BD59-A6C34878D82A}">
-                    <a16:rowId xmlns:a16="http://schemas.microsoft.com/office/drawing/2014/main" val="2456093236"/>
-                  </a:ext>
-                </a:extLst>
-              </a:tr>
-              <a:tr h="325120">
-                <a:tc>
-                  <a:txBody>
-                    <a:bodyPr/>
-                    <a:lstStyle/>
-                    <a:p>
-                      <a:pPr marL="342900" marR="0" lvl="0" indent="-342900" algn="l" defTabSz="914400" rtl="0" eaLnBrk="1" fontAlgn="auto" latinLnBrk="0" hangingPunct="1">
-                        <a:lnSpc>
-                          <a:spcPct val="100000"/>
-                        </a:lnSpc>
-                        <a:spcBef>
-                          <a:spcPts val="0"/>
-                        </a:spcBef>
-                        <a:spcAft>
-                          <a:spcPts val="0"/>
-                        </a:spcAft>
-                        <a:buClrTx/>
-                        <a:buSzTx/>
-                        <a:buFont typeface="Wingdings" panose="05000000000000000000" pitchFamily="2" charset="2"/>
-                        <a:buChar char="§"/>
-                        <a:tabLst/>
-                        <a:defRPr/>
-                      </a:pPr>
-                      <a:r>
-                        <a:rPr lang="en-US" sz="2000" b="0" dirty="0"/>
-                        <a:t>Plotly</a:t>
-                      </a:r>
-                      <a:endParaRPr lang="en-US" sz="2000" b="0" dirty="0">
-                        <a:solidFill>
-                          <a:schemeClr val="tx1"/>
-                        </a:solidFill>
-                      </a:endParaRPr>
-                    </a:p>
-                  </a:txBody>
-                  <a:tcPr>
-                    <a:lnL w="12700" cap="flat" cmpd="sng" algn="ctr">
-                      <a:solidFill>
-                        <a:schemeClr val="tx1"/>
-                      </a:solidFill>
-                      <a:prstDash val="solid"/>
-                      <a:round/>
-                      <a:headEnd type="none" w="med" len="med"/>
-                      <a:tailEnd type="none" w="med" len="med"/>
-                    </a:lnL>
-                  </a:tcPr>
-                </a:tc>
-                <a:tc>
-                  <a:txBody>
-                    <a:bodyPr/>
-                    <a:lstStyle/>
-                    <a:p>
-                      <a:pPr marL="0" marR="0" lvl="0" indent="0" algn="l" defTabSz="914400" rtl="0" eaLnBrk="1" fontAlgn="auto" latinLnBrk="0" hangingPunct="1">
-                        <a:lnSpc>
-                          <a:spcPct val="100000"/>
-                        </a:lnSpc>
-                        <a:spcBef>
-                          <a:spcPts val="0"/>
-                        </a:spcBef>
-                        <a:spcAft>
-                          <a:spcPts val="0"/>
-                        </a:spcAft>
-                        <a:buClrTx/>
-                        <a:buSzTx/>
-                        <a:buFont typeface="Wingdings" panose="05000000000000000000" pitchFamily="2" charset="2"/>
-                        <a:buChar char="§"/>
-                        <a:tabLst/>
-                        <a:defRPr/>
-                      </a:pPr>
-                      <a:r>
-                        <a:rPr lang="en-US" sz="2000" b="0" dirty="0">
-                          <a:solidFill>
-                            <a:schemeClr val="tx1"/>
-                          </a:solidFill>
-                        </a:rPr>
-                        <a:t>    CSS</a:t>
-                      </a:r>
-                    </a:p>
-                  </a:txBody>
-                  <a:tcPr>
-                    <a:lnR w="12700" cap="flat" cmpd="sng" algn="ctr">
-                      <a:solidFill>
-                        <a:schemeClr val="tx1"/>
-                      </a:solidFill>
-                      <a:prstDash val="solid"/>
-                      <a:round/>
-                      <a:headEnd type="none" w="med" len="med"/>
-                      <a:tailEnd type="none" w="med" len="med"/>
-                    </a:lnR>
-                  </a:tcPr>
-                </a:tc>
-                <a:extLst>
-                  <a:ext uri="{0D108BD9-81ED-4DB2-BD59-A6C34878D82A}">
-                    <a16:rowId xmlns:a16="http://schemas.microsoft.com/office/drawing/2014/main" val="706471515"/>
-                  </a:ext>
-                </a:extLst>
-              </a:tr>
-              <a:tr h="426720">
-                <a:tc>
-                  <a:txBody>
-                    <a:bodyPr/>
-                    <a:lstStyle/>
-                    <a:p>
-                      <a:pPr marL="342900" marR="0" lvl="0" indent="-342900" algn="l" defTabSz="914400" rtl="0" eaLnBrk="1" fontAlgn="auto" latinLnBrk="0" hangingPunct="1">
-                        <a:lnSpc>
-                          <a:spcPct val="100000"/>
-                        </a:lnSpc>
-                        <a:spcBef>
-                          <a:spcPts val="0"/>
-                        </a:spcBef>
-                        <a:spcAft>
-                          <a:spcPts val="0"/>
-                        </a:spcAft>
-                        <a:buClrTx/>
-                        <a:buSzTx/>
-                        <a:buFont typeface="Wingdings" panose="05000000000000000000" pitchFamily="2" charset="2"/>
-                        <a:buChar char="§"/>
-                        <a:tabLst/>
-                        <a:defRPr/>
-                      </a:pPr>
-                      <a:r>
-                        <a:rPr lang="en-US" sz="2000" b="0" dirty="0">
-                          <a:solidFill>
-                            <a:schemeClr val="tx1"/>
-                          </a:solidFill>
-                        </a:rPr>
-                        <a:t>Python</a:t>
-                      </a:r>
-                    </a:p>
-                  </a:txBody>
-                  <a:tcPr>
-                    <a:lnL w="12700" cap="flat" cmpd="sng" algn="ctr">
-                      <a:solidFill>
-                        <a:schemeClr val="tx1"/>
-                      </a:solidFill>
-                      <a:prstDash val="solid"/>
-                      <a:round/>
-                      <a:headEnd type="none" w="med" len="med"/>
-                      <a:tailEnd type="none" w="med" len="med"/>
-                    </a:lnL>
-                  </a:tcPr>
-                </a:tc>
-                <a:tc>
-                  <a:txBody>
-                    <a:bodyPr/>
-                    <a:lstStyle/>
-                    <a:p>
-                      <a:pPr marL="342900" marR="0" lvl="0" indent="-342900" algn="l" defTabSz="914400" rtl="0" eaLnBrk="1" fontAlgn="auto" latinLnBrk="0" hangingPunct="1">
-                        <a:lnSpc>
-                          <a:spcPct val="100000"/>
-                        </a:lnSpc>
-                        <a:spcBef>
-                          <a:spcPts val="0"/>
-                        </a:spcBef>
-                        <a:spcAft>
-                          <a:spcPts val="0"/>
-                        </a:spcAft>
-                        <a:buClrTx/>
-                        <a:buSzTx/>
-                        <a:buFont typeface="Wingdings" panose="05000000000000000000" pitchFamily="2" charset="2"/>
-                        <a:buChar char="§"/>
-                        <a:tabLst/>
-                        <a:defRPr/>
-                      </a:pPr>
-                      <a:r>
-                        <a:rPr lang="en-US" sz="2000" b="0" dirty="0"/>
-                        <a:t>GitHub</a:t>
-                      </a:r>
-                      <a:endParaRPr lang="en-US" sz="2000" b="0" dirty="0">
-                        <a:solidFill>
-                          <a:schemeClr val="tx1"/>
-                        </a:solidFill>
-                      </a:endParaRPr>
-                    </a:p>
-                  </a:txBody>
-                  <a:tcPr>
-                    <a:lnR w="12700" cap="flat" cmpd="sng" algn="ctr">
-                      <a:solidFill>
-                        <a:schemeClr val="tx1"/>
-                      </a:solidFill>
-                      <a:prstDash val="solid"/>
-                      <a:round/>
-                      <a:headEnd type="none" w="med" len="med"/>
-                      <a:tailEnd type="none" w="med" len="med"/>
-                    </a:lnR>
-                  </a:tcPr>
-                </a:tc>
-                <a:extLst>
-                  <a:ext uri="{0D108BD9-81ED-4DB2-BD59-A6C34878D82A}">
-                    <a16:rowId xmlns:a16="http://schemas.microsoft.com/office/drawing/2014/main" val="2519319064"/>
-                  </a:ext>
-                </a:extLst>
-              </a:tr>
-              <a:tr h="396240">
-                <a:tc>
-                  <a:txBody>
-                    <a:bodyPr/>
-                    <a:lstStyle/>
-                    <a:p>
-                      <a:pPr marL="342900" marR="0" lvl="0" indent="-342900" algn="l" defTabSz="914400" rtl="0" eaLnBrk="1" fontAlgn="auto" latinLnBrk="0" hangingPunct="1">
-                        <a:lnSpc>
-                          <a:spcPct val="100000"/>
-                        </a:lnSpc>
-                        <a:spcBef>
-                          <a:spcPts val="0"/>
-                        </a:spcBef>
-                        <a:spcAft>
-                          <a:spcPts val="0"/>
-                        </a:spcAft>
-                        <a:buClrTx/>
-                        <a:buSzTx/>
-                        <a:buFont typeface="Wingdings" panose="05000000000000000000" pitchFamily="2" charset="2"/>
-                        <a:buChar char="§"/>
-                        <a:tabLst/>
-                        <a:defRPr/>
-                      </a:pPr>
-                      <a:r>
-                        <a:rPr lang="en-US" sz="2000" b="0" dirty="0" err="1">
-                          <a:solidFill>
-                            <a:schemeClr val="tx1"/>
-                          </a:solidFill>
-                        </a:rPr>
-                        <a:t>Javascript</a:t>
-                      </a:r>
-                      <a:endParaRPr lang="en-US" sz="2000" b="0" dirty="0">
-                        <a:solidFill>
-                          <a:schemeClr val="tx1"/>
-                        </a:solidFill>
-                      </a:endParaRPr>
-                    </a:p>
-                  </a:txBody>
-                  <a:tcPr>
-                    <a:lnL w="12700" cap="flat" cmpd="sng" algn="ctr">
-                      <a:solidFill>
-                        <a:schemeClr val="tx1"/>
-                      </a:solidFill>
-                      <a:prstDash val="solid"/>
-                      <a:round/>
-                      <a:headEnd type="none" w="med" len="med"/>
-                      <a:tailEnd type="none" w="med" len="med"/>
-                    </a:lnL>
-                  </a:tcPr>
-                </a:tc>
-                <a:tc>
-                  <a:txBody>
-                    <a:bodyPr/>
-                    <a:lstStyle/>
-                    <a:p>
-                      <a:pPr marL="342900" marR="0" lvl="0" indent="-342900" algn="l" defTabSz="914400" rtl="0" eaLnBrk="1" fontAlgn="auto" latinLnBrk="0" hangingPunct="1">
-                        <a:lnSpc>
-                          <a:spcPct val="100000"/>
-                        </a:lnSpc>
-                        <a:spcBef>
-                          <a:spcPts val="0"/>
-                        </a:spcBef>
-                        <a:spcAft>
-                          <a:spcPts val="0"/>
-                        </a:spcAft>
-                        <a:buClrTx/>
-                        <a:buSzTx/>
-                        <a:buFont typeface="Wingdings" panose="05000000000000000000" pitchFamily="2" charset="2"/>
-                        <a:buChar char="§"/>
-                        <a:tabLst/>
-                        <a:defRPr/>
-                      </a:pPr>
-                      <a:r>
-                        <a:rPr lang="en-US" sz="2000" b="0" dirty="0"/>
-                        <a:t>Heroku Application</a:t>
-                      </a:r>
-                      <a:endParaRPr lang="en-US" sz="2000" b="0" dirty="0">
-                        <a:solidFill>
-                          <a:schemeClr val="tx1"/>
-                        </a:solidFill>
-                      </a:endParaRPr>
-                    </a:p>
-                  </a:txBody>
-                  <a:tcPr>
-                    <a:lnR w="12700" cap="flat" cmpd="sng" algn="ctr">
-                      <a:solidFill>
-                        <a:schemeClr val="tx1"/>
-                      </a:solidFill>
-                      <a:prstDash val="solid"/>
-                      <a:round/>
-                      <a:headEnd type="none" w="med" len="med"/>
-                      <a:tailEnd type="none" w="med" len="med"/>
-                    </a:lnR>
-                  </a:tcPr>
-                </a:tc>
-                <a:extLst>
-                  <a:ext uri="{0D108BD9-81ED-4DB2-BD59-A6C34878D82A}">
-                    <a16:rowId xmlns:a16="http://schemas.microsoft.com/office/drawing/2014/main" val="1426915378"/>
-                  </a:ext>
-                </a:extLst>
-              </a:tr>
-              <a:tr h="396240">
-                <a:tc>
-                  <a:txBody>
-                    <a:bodyPr/>
-                    <a:lstStyle/>
-                    <a:p>
-                      <a:pPr marL="342900" marR="0" lvl="0" indent="-342900" algn="l" defTabSz="914400" rtl="0" eaLnBrk="1" fontAlgn="auto" latinLnBrk="0" hangingPunct="1">
-                        <a:lnSpc>
-                          <a:spcPct val="100000"/>
-                        </a:lnSpc>
-                        <a:spcBef>
-                          <a:spcPts val="0"/>
-                        </a:spcBef>
-                        <a:spcAft>
-                          <a:spcPts val="0"/>
-                        </a:spcAft>
-                        <a:buClrTx/>
-                        <a:buSzTx/>
-                        <a:buFont typeface="Wingdings" panose="05000000000000000000" pitchFamily="2" charset="2"/>
-                        <a:buChar char="§"/>
-                        <a:tabLst/>
-                        <a:defRPr/>
-                      </a:pPr>
-                      <a:r>
-                        <a:rPr lang="en-US" sz="2000" b="0" dirty="0">
-                          <a:solidFill>
-                            <a:schemeClr val="tx1"/>
-                          </a:solidFill>
-                        </a:rPr>
-                        <a:t>SQLAlchemy</a:t>
-                      </a:r>
-                    </a:p>
-                  </a:txBody>
-                  <a:tcPr>
-                    <a:lnL w="12700" cap="flat" cmpd="sng" algn="ctr">
-                      <a:solidFill>
-                        <a:schemeClr val="tx1"/>
-                      </a:solidFill>
-                      <a:prstDash val="solid"/>
-                      <a:round/>
-                      <a:headEnd type="none" w="med" len="med"/>
-                      <a:tailEnd type="none" w="med" len="med"/>
-                    </a:lnL>
-                    <a:lnB w="12700" cap="flat" cmpd="sng" algn="ctr">
-                      <a:solidFill>
-                        <a:schemeClr val="tx1"/>
-                      </a:solidFill>
-                      <a:prstDash val="solid"/>
-                      <a:round/>
-                      <a:headEnd type="none" w="med" len="med"/>
-                      <a:tailEnd type="none" w="med" len="med"/>
-                    </a:lnB>
-                  </a:tcPr>
-                </a:tc>
-                <a:tc>
-                  <a:txBody>
-                    <a:bodyPr/>
-                    <a:lstStyle/>
-                    <a:p>
-                      <a:pPr marL="342900" marR="0" lvl="0" indent="-342900" algn="l" defTabSz="914400" rtl="0" eaLnBrk="1" fontAlgn="auto" latinLnBrk="0" hangingPunct="1">
-                        <a:lnSpc>
-                          <a:spcPct val="100000"/>
-                        </a:lnSpc>
-                        <a:spcBef>
-                          <a:spcPts val="0"/>
-                        </a:spcBef>
-                        <a:spcAft>
-                          <a:spcPts val="0"/>
-                        </a:spcAft>
-                        <a:buClrTx/>
-                        <a:buSzTx/>
-                        <a:buFont typeface="Wingdings" panose="05000000000000000000" pitchFamily="2" charset="2"/>
-                        <a:buChar char="§"/>
-                        <a:tabLst/>
-                        <a:defRPr/>
-                      </a:pPr>
-                      <a:r>
-                        <a:rPr lang="en-US" sz="2000" b="0" dirty="0">
-                          <a:solidFill>
-                            <a:schemeClr val="tx1"/>
-                          </a:solidFill>
-                        </a:rPr>
-                        <a:t>SQLite</a:t>
-                      </a:r>
-                    </a:p>
-                  </a:txBody>
-                  <a:tcPr>
-                    <a:lnR w="12700" cap="flat" cmpd="sng" algn="ctr">
-                      <a:solidFill>
-                        <a:schemeClr val="tx1"/>
-                      </a:solidFill>
-                      <a:prstDash val="solid"/>
-                      <a:round/>
-                      <a:headEnd type="none" w="med" len="med"/>
-                      <a:tailEnd type="none" w="med" len="med"/>
-                    </a:lnR>
-                    <a:lnB w="12700" cap="flat" cmpd="sng" algn="ctr">
-                      <a:solidFill>
-                        <a:schemeClr val="tx1"/>
-                      </a:solidFill>
-                      <a:prstDash val="solid"/>
-                      <a:round/>
-                      <a:headEnd type="none" w="med" len="med"/>
-                      <a:tailEnd type="none" w="med" len="med"/>
-                    </a:lnB>
-                  </a:tcPr>
-                </a:tc>
-                <a:extLst>
-                  <a:ext uri="{0D108BD9-81ED-4DB2-BD59-A6C34878D82A}">
-                    <a16:rowId xmlns:a16="http://schemas.microsoft.com/office/drawing/2014/main" val="2794767807"/>
-                  </a:ext>
-                </a:extLst>
-              </a:tr>
-            </a:tbl>
-          </a:graphicData>
-        </a:graphic>
-      </p:graphicFrame>
       <p:sp>
         <p:nvSpPr>
           <p:cNvPr id="4" name="Title 1">
@@ -7120,6 +6240,628 @@
           </a:graphicData>
         </a:graphic>
       </p:graphicFrame>
+      <p:sp>
+        <p:nvSpPr>
+          <p:cNvPr id="5" name="Rectangle: Rounded Corners 4">
+            <a:extLst>
+              <a:ext uri="{FF2B5EF4-FFF2-40B4-BE49-F238E27FC236}">
+                <a16:creationId xmlns:a16="http://schemas.microsoft.com/office/drawing/2014/main" id="{643325EA-E4F6-4A7F-8190-2560B8EA7FC7}"/>
+              </a:ext>
+            </a:extLst>
+          </p:cNvPr>
+          <p:cNvSpPr/>
+          <p:nvPr/>
+        </p:nvSpPr>
+        <p:spPr>
+          <a:xfrm>
+            <a:off x="8285480" y="2531597"/>
+            <a:ext cx="2326640" cy="660400"/>
+          </a:xfrm>
+          <a:prstGeom prst="roundRect">
+            <a:avLst/>
+          </a:prstGeom>
+          <a:solidFill>
+            <a:schemeClr val="bg1"/>
+          </a:solidFill>
+        </p:spPr>
+        <p:style>
+          <a:lnRef idx="2">
+            <a:schemeClr val="accent1">
+              <a:shade val="50000"/>
+            </a:schemeClr>
+          </a:lnRef>
+          <a:fillRef idx="1">
+            <a:schemeClr val="accent1"/>
+          </a:fillRef>
+          <a:effectRef idx="0">
+            <a:schemeClr val="accent1"/>
+          </a:effectRef>
+          <a:fontRef idx="minor">
+            <a:schemeClr val="lt1"/>
+          </a:fontRef>
+        </p:style>
+        <p:txBody>
+          <a:bodyPr rtlCol="0" anchor="ctr"/>
+          <a:lstStyle/>
+          <a:p>
+            <a:pPr algn="ctr"/>
+            <a:r>
+              <a:rPr lang="en-US" dirty="0">
+                <a:solidFill>
+                  <a:schemeClr val="tx1"/>
+                </a:solidFill>
+              </a:rPr>
+              <a:t>Flask(/), </a:t>
+            </a:r>
+            <a:r>
+              <a:rPr lang="en-US" dirty="0" err="1">
+                <a:solidFill>
+                  <a:schemeClr val="tx1"/>
+                </a:solidFill>
+              </a:rPr>
+              <a:t>SQLAlchemy</a:t>
+            </a:r>
+            <a:r>
+              <a:rPr lang="en-US" dirty="0">
+                <a:solidFill>
+                  <a:schemeClr val="tx1"/>
+                </a:solidFill>
+              </a:rPr>
+              <a:t>, SQLite</a:t>
+            </a:r>
+          </a:p>
+        </p:txBody>
+      </p:sp>
+      <p:sp>
+        <p:nvSpPr>
+          <p:cNvPr id="11" name="Rectangle: Rounded Corners 10">
+            <a:extLst>
+              <a:ext uri="{FF2B5EF4-FFF2-40B4-BE49-F238E27FC236}">
+                <a16:creationId xmlns:a16="http://schemas.microsoft.com/office/drawing/2014/main" id="{56773CAA-F6D8-45B8-9C01-05ADE91C4138}"/>
+              </a:ext>
+            </a:extLst>
+          </p:cNvPr>
+          <p:cNvSpPr/>
+          <p:nvPr/>
+        </p:nvSpPr>
+        <p:spPr>
+          <a:xfrm>
+            <a:off x="8351520" y="3639523"/>
+            <a:ext cx="2326640" cy="660400"/>
+          </a:xfrm>
+          <a:prstGeom prst="roundRect">
+            <a:avLst/>
+          </a:prstGeom>
+          <a:solidFill>
+            <a:schemeClr val="bg1"/>
+          </a:solidFill>
+        </p:spPr>
+        <p:style>
+          <a:lnRef idx="2">
+            <a:schemeClr val="accent1">
+              <a:shade val="50000"/>
+            </a:schemeClr>
+          </a:lnRef>
+          <a:fillRef idx="1">
+            <a:schemeClr val="accent1"/>
+          </a:fillRef>
+          <a:effectRef idx="0">
+            <a:schemeClr val="accent1"/>
+          </a:effectRef>
+          <a:fontRef idx="minor">
+            <a:schemeClr val="lt1"/>
+          </a:fontRef>
+        </p:style>
+        <p:txBody>
+          <a:bodyPr rtlCol="0" anchor="ctr"/>
+          <a:lstStyle/>
+          <a:p>
+            <a:pPr algn="ctr"/>
+            <a:r>
+              <a:rPr lang="en-US" dirty="0">
+                <a:solidFill>
+                  <a:schemeClr val="tx1"/>
+                </a:solidFill>
+              </a:rPr>
+              <a:t>Libraries: </a:t>
+            </a:r>
+            <a:r>
+              <a:rPr lang="en-US" dirty="0" err="1">
+                <a:solidFill>
+                  <a:schemeClr val="tx1"/>
+                </a:solidFill>
+              </a:rPr>
+              <a:t>Javascript</a:t>
+            </a:r>
+            <a:r>
+              <a:rPr lang="en-US" dirty="0">
+                <a:solidFill>
+                  <a:schemeClr val="tx1"/>
+                </a:solidFill>
+              </a:rPr>
+              <a:t>, D3, jQuery</a:t>
+            </a:r>
+          </a:p>
+        </p:txBody>
+      </p:sp>
+      <p:sp>
+        <p:nvSpPr>
+          <p:cNvPr id="12" name="Rectangle: Rounded Corners 11">
+            <a:extLst>
+              <a:ext uri="{FF2B5EF4-FFF2-40B4-BE49-F238E27FC236}">
+                <a16:creationId xmlns:a16="http://schemas.microsoft.com/office/drawing/2014/main" id="{15499DD3-D1F1-4F5C-ADD5-0725DB68B655}"/>
+              </a:ext>
+            </a:extLst>
+          </p:cNvPr>
+          <p:cNvSpPr/>
+          <p:nvPr/>
+        </p:nvSpPr>
+        <p:spPr>
+          <a:xfrm>
+            <a:off x="8285480" y="1488142"/>
+            <a:ext cx="2326640" cy="660400"/>
+          </a:xfrm>
+          <a:prstGeom prst="roundRect">
+            <a:avLst/>
+          </a:prstGeom>
+          <a:solidFill>
+            <a:schemeClr val="bg1"/>
+          </a:solidFill>
+        </p:spPr>
+        <p:style>
+          <a:lnRef idx="2">
+            <a:schemeClr val="accent1">
+              <a:shade val="50000"/>
+            </a:schemeClr>
+          </a:lnRef>
+          <a:fillRef idx="1">
+            <a:schemeClr val="accent1"/>
+          </a:fillRef>
+          <a:effectRef idx="0">
+            <a:schemeClr val="accent1"/>
+          </a:effectRef>
+          <a:fontRef idx="minor">
+            <a:schemeClr val="lt1"/>
+          </a:fontRef>
+        </p:style>
+        <p:txBody>
+          <a:bodyPr rtlCol="0" anchor="ctr"/>
+          <a:lstStyle/>
+          <a:p>
+            <a:pPr algn="ctr"/>
+            <a:r>
+              <a:rPr lang="en-US" dirty="0">
+                <a:solidFill>
+                  <a:schemeClr val="tx1"/>
+                </a:solidFill>
+              </a:rPr>
+              <a:t>Data Files (.json, .csv, .</a:t>
+            </a:r>
+            <a:r>
+              <a:rPr lang="en-US" dirty="0" err="1">
+                <a:solidFill>
+                  <a:schemeClr val="tx1"/>
+                </a:solidFill>
+              </a:rPr>
+              <a:t>db</a:t>
+            </a:r>
+            <a:r>
+              <a:rPr lang="en-US" dirty="0">
+                <a:solidFill>
+                  <a:schemeClr val="tx1"/>
+                </a:solidFill>
+              </a:rPr>
+              <a:t>) </a:t>
+            </a:r>
+          </a:p>
+        </p:txBody>
+      </p:sp>
+      <p:sp>
+        <p:nvSpPr>
+          <p:cNvPr id="14" name="Rectangle: Rounded Corners 13">
+            <a:extLst>
+              <a:ext uri="{FF2B5EF4-FFF2-40B4-BE49-F238E27FC236}">
+                <a16:creationId xmlns:a16="http://schemas.microsoft.com/office/drawing/2014/main" id="{846E3B9E-D703-470E-A390-4F14BDC46DCC}"/>
+              </a:ext>
+            </a:extLst>
+          </p:cNvPr>
+          <p:cNvSpPr/>
+          <p:nvPr/>
+        </p:nvSpPr>
+        <p:spPr>
+          <a:xfrm>
+            <a:off x="9865360" y="5002537"/>
+            <a:ext cx="2326640" cy="660400"/>
+          </a:xfrm>
+          <a:prstGeom prst="roundRect">
+            <a:avLst/>
+          </a:prstGeom>
+          <a:solidFill>
+            <a:schemeClr val="bg1"/>
+          </a:solidFill>
+        </p:spPr>
+        <p:style>
+          <a:lnRef idx="2">
+            <a:schemeClr val="accent1">
+              <a:shade val="50000"/>
+            </a:schemeClr>
+          </a:lnRef>
+          <a:fillRef idx="1">
+            <a:schemeClr val="accent1"/>
+          </a:fillRef>
+          <a:effectRef idx="0">
+            <a:schemeClr val="accent1"/>
+          </a:effectRef>
+          <a:fontRef idx="minor">
+            <a:schemeClr val="lt1"/>
+          </a:fontRef>
+        </p:style>
+        <p:txBody>
+          <a:bodyPr rtlCol="0" anchor="ctr"/>
+          <a:lstStyle/>
+          <a:p>
+            <a:pPr algn="ctr"/>
+            <a:r>
+              <a:rPr lang="en-US" dirty="0">
+                <a:solidFill>
+                  <a:schemeClr val="tx1"/>
+                </a:solidFill>
+              </a:rPr>
+              <a:t>Leaflet, </a:t>
+            </a:r>
+            <a:r>
+              <a:rPr lang="en-US" dirty="0" err="1">
+                <a:solidFill>
+                  <a:schemeClr val="tx1"/>
+                </a:solidFill>
+              </a:rPr>
+              <a:t>Plotly</a:t>
+            </a:r>
+            <a:endParaRPr lang="en-US" dirty="0">
+              <a:solidFill>
+                <a:schemeClr val="tx1"/>
+              </a:solidFill>
+            </a:endParaRPr>
+          </a:p>
+        </p:txBody>
+      </p:sp>
+      <p:sp>
+        <p:nvSpPr>
+          <p:cNvPr id="15" name="Rectangle: Rounded Corners 14">
+            <a:extLst>
+              <a:ext uri="{FF2B5EF4-FFF2-40B4-BE49-F238E27FC236}">
+                <a16:creationId xmlns:a16="http://schemas.microsoft.com/office/drawing/2014/main" id="{57E9C60F-DE65-4A4A-8FDD-90D5E22839A5}"/>
+              </a:ext>
+            </a:extLst>
+          </p:cNvPr>
+          <p:cNvSpPr/>
+          <p:nvPr/>
+        </p:nvSpPr>
+        <p:spPr>
+          <a:xfrm>
+            <a:off x="7264400" y="5026422"/>
+            <a:ext cx="2326640" cy="660400"/>
+          </a:xfrm>
+          <a:prstGeom prst="roundRect">
+            <a:avLst/>
+          </a:prstGeom>
+          <a:solidFill>
+            <a:schemeClr val="bg1"/>
+          </a:solidFill>
+        </p:spPr>
+        <p:style>
+          <a:lnRef idx="2">
+            <a:schemeClr val="accent1">
+              <a:shade val="50000"/>
+            </a:schemeClr>
+          </a:lnRef>
+          <a:fillRef idx="1">
+            <a:schemeClr val="accent1"/>
+          </a:fillRef>
+          <a:effectRef idx="0">
+            <a:schemeClr val="accent1"/>
+          </a:effectRef>
+          <a:fontRef idx="minor">
+            <a:schemeClr val="lt1"/>
+          </a:fontRef>
+        </p:style>
+        <p:txBody>
+          <a:bodyPr rtlCol="0" anchor="ctr"/>
+          <a:lstStyle/>
+          <a:p>
+            <a:pPr algn="ctr"/>
+            <a:r>
+              <a:rPr lang="en-US" dirty="0">
+                <a:solidFill>
+                  <a:schemeClr val="tx1"/>
+                </a:solidFill>
+              </a:rPr>
+              <a:t>HTML Template, CSS, Bootstrap</a:t>
+            </a:r>
+          </a:p>
+        </p:txBody>
+      </p:sp>
+      <p:sp>
+        <p:nvSpPr>
+          <p:cNvPr id="17" name="Rectangle: Rounded Corners 16">
+            <a:extLst>
+              <a:ext uri="{FF2B5EF4-FFF2-40B4-BE49-F238E27FC236}">
+                <a16:creationId xmlns:a16="http://schemas.microsoft.com/office/drawing/2014/main" id="{623D50B7-B35B-4700-AB86-8A3522D64685}"/>
+              </a:ext>
+            </a:extLst>
+          </p:cNvPr>
+          <p:cNvSpPr/>
+          <p:nvPr/>
+        </p:nvSpPr>
+        <p:spPr>
+          <a:xfrm>
+            <a:off x="8605520" y="6119039"/>
+            <a:ext cx="2326640" cy="660400"/>
+          </a:xfrm>
+          <a:prstGeom prst="roundRect">
+            <a:avLst/>
+          </a:prstGeom>
+          <a:solidFill>
+            <a:schemeClr val="bg1"/>
+          </a:solidFill>
+        </p:spPr>
+        <p:style>
+          <a:lnRef idx="2">
+            <a:schemeClr val="accent1">
+              <a:shade val="50000"/>
+            </a:schemeClr>
+          </a:lnRef>
+          <a:fillRef idx="1">
+            <a:schemeClr val="accent1"/>
+          </a:fillRef>
+          <a:effectRef idx="0">
+            <a:schemeClr val="accent1"/>
+          </a:effectRef>
+          <a:fontRef idx="minor">
+            <a:schemeClr val="lt1"/>
+          </a:fontRef>
+        </p:style>
+        <p:txBody>
+          <a:bodyPr rtlCol="0" anchor="ctr"/>
+          <a:lstStyle/>
+          <a:p>
+            <a:pPr algn="ctr"/>
+            <a:r>
+              <a:rPr lang="en-US" dirty="0">
+                <a:solidFill>
+                  <a:schemeClr val="tx1"/>
+                </a:solidFill>
+              </a:rPr>
+              <a:t>Heroku Application, </a:t>
+            </a:r>
+            <a:r>
+              <a:rPr lang="en-US" dirty="0" err="1">
+                <a:solidFill>
+                  <a:schemeClr val="tx1"/>
+                </a:solidFill>
+              </a:rPr>
+              <a:t>Github</a:t>
+            </a:r>
+            <a:endParaRPr lang="en-US" dirty="0">
+              <a:solidFill>
+                <a:schemeClr val="tx1"/>
+              </a:solidFill>
+            </a:endParaRPr>
+          </a:p>
+        </p:txBody>
+      </p:sp>
+      <p:cxnSp>
+        <p:nvCxnSpPr>
+          <p:cNvPr id="7" name="Straight Arrow Connector 6">
+            <a:extLst>
+              <a:ext uri="{FF2B5EF4-FFF2-40B4-BE49-F238E27FC236}">
+                <a16:creationId xmlns:a16="http://schemas.microsoft.com/office/drawing/2014/main" id="{D93E1000-237D-4DED-A4D2-CCE55AE70928}"/>
+              </a:ext>
+            </a:extLst>
+          </p:cNvPr>
+          <p:cNvCxnSpPr>
+            <a:cxnSpLocks/>
+            <a:stCxn id="12" idx="2"/>
+            <a:endCxn id="5" idx="0"/>
+          </p:cNvCxnSpPr>
+          <p:nvPr/>
+        </p:nvCxnSpPr>
+        <p:spPr>
+          <a:xfrm>
+            <a:off x="9448800" y="2148542"/>
+            <a:ext cx="0" cy="383055"/>
+          </a:xfrm>
+          <a:prstGeom prst="straightConnector1">
+            <a:avLst/>
+          </a:prstGeom>
+          <a:ln>
+            <a:tailEnd type="triangle"/>
+          </a:ln>
+        </p:spPr>
+        <p:style>
+          <a:lnRef idx="1">
+            <a:schemeClr val="accent1"/>
+          </a:lnRef>
+          <a:fillRef idx="0">
+            <a:schemeClr val="accent1"/>
+          </a:fillRef>
+          <a:effectRef idx="0">
+            <a:schemeClr val="accent1"/>
+          </a:effectRef>
+          <a:fontRef idx="minor">
+            <a:schemeClr val="tx1"/>
+          </a:fontRef>
+        </p:style>
+      </p:cxnSp>
+      <p:cxnSp>
+        <p:nvCxnSpPr>
+          <p:cNvPr id="23" name="Straight Arrow Connector 22">
+            <a:extLst>
+              <a:ext uri="{FF2B5EF4-FFF2-40B4-BE49-F238E27FC236}">
+                <a16:creationId xmlns:a16="http://schemas.microsoft.com/office/drawing/2014/main" id="{5CC6214C-AC33-49F0-95DF-58A69A1C1A0E}"/>
+              </a:ext>
+            </a:extLst>
+          </p:cNvPr>
+          <p:cNvCxnSpPr>
+            <a:cxnSpLocks/>
+            <a:endCxn id="15" idx="0"/>
+          </p:cNvCxnSpPr>
+          <p:nvPr/>
+        </p:nvCxnSpPr>
+        <p:spPr>
+          <a:xfrm flipH="1">
+            <a:off x="8427720" y="4277511"/>
+            <a:ext cx="706120" cy="748911"/>
+          </a:xfrm>
+          <a:prstGeom prst="straightConnector1">
+            <a:avLst/>
+          </a:prstGeom>
+          <a:ln>
+            <a:tailEnd type="triangle"/>
+          </a:ln>
+        </p:spPr>
+        <p:style>
+          <a:lnRef idx="1">
+            <a:schemeClr val="accent1"/>
+          </a:lnRef>
+          <a:fillRef idx="0">
+            <a:schemeClr val="accent1"/>
+          </a:fillRef>
+          <a:effectRef idx="0">
+            <a:schemeClr val="accent1"/>
+          </a:effectRef>
+          <a:fontRef idx="minor">
+            <a:schemeClr val="tx1"/>
+          </a:fontRef>
+        </p:style>
+      </p:cxnSp>
+      <p:cxnSp>
+        <p:nvCxnSpPr>
+          <p:cNvPr id="29" name="Straight Arrow Connector 28">
+            <a:extLst>
+              <a:ext uri="{FF2B5EF4-FFF2-40B4-BE49-F238E27FC236}">
+                <a16:creationId xmlns:a16="http://schemas.microsoft.com/office/drawing/2014/main" id="{8AC74CA0-FBB2-4E00-A88E-C6BA66BB0E3A}"/>
+              </a:ext>
+            </a:extLst>
+          </p:cNvPr>
+          <p:cNvCxnSpPr>
+            <a:cxnSpLocks/>
+            <a:endCxn id="11" idx="0"/>
+          </p:cNvCxnSpPr>
+          <p:nvPr/>
+        </p:nvCxnSpPr>
+        <p:spPr>
+          <a:xfrm>
+            <a:off x="9514840" y="3186189"/>
+            <a:ext cx="0" cy="453334"/>
+          </a:xfrm>
+          <a:prstGeom prst="straightConnector1">
+            <a:avLst/>
+          </a:prstGeom>
+          <a:ln>
+            <a:tailEnd type="triangle"/>
+          </a:ln>
+        </p:spPr>
+        <p:style>
+          <a:lnRef idx="1">
+            <a:schemeClr val="accent1"/>
+          </a:lnRef>
+          <a:fillRef idx="0">
+            <a:schemeClr val="accent1"/>
+          </a:fillRef>
+          <a:effectRef idx="0">
+            <a:schemeClr val="accent1"/>
+          </a:effectRef>
+          <a:fontRef idx="minor">
+            <a:schemeClr val="tx1"/>
+          </a:fontRef>
+        </p:style>
+      </p:cxnSp>
+      <p:cxnSp>
+        <p:nvCxnSpPr>
+          <p:cNvPr id="51" name="Straight Arrow Connector 50">
+            <a:extLst>
+              <a:ext uri="{FF2B5EF4-FFF2-40B4-BE49-F238E27FC236}">
+                <a16:creationId xmlns:a16="http://schemas.microsoft.com/office/drawing/2014/main" id="{6793EABA-3E6B-44B8-9331-4E7C82346887}"/>
+              </a:ext>
+            </a:extLst>
+          </p:cNvPr>
+          <p:cNvCxnSpPr>
+            <a:cxnSpLocks/>
+            <a:stCxn id="14" idx="0"/>
+          </p:cNvCxnSpPr>
+          <p:nvPr/>
+        </p:nvCxnSpPr>
+        <p:spPr>
+          <a:xfrm flipH="1" flipV="1">
+            <a:off x="9936480" y="4294115"/>
+            <a:ext cx="1092200" cy="708422"/>
+          </a:xfrm>
+          <a:prstGeom prst="straightConnector1">
+            <a:avLst/>
+          </a:prstGeom>
+          <a:ln>
+            <a:tailEnd type="triangle"/>
+          </a:ln>
+        </p:spPr>
+        <p:style>
+          <a:lnRef idx="1">
+            <a:schemeClr val="accent1"/>
+          </a:lnRef>
+          <a:fillRef idx="0">
+            <a:schemeClr val="accent1"/>
+          </a:fillRef>
+          <a:effectRef idx="0">
+            <a:schemeClr val="accent1"/>
+          </a:effectRef>
+          <a:fontRef idx="minor">
+            <a:schemeClr val="tx1"/>
+          </a:fontRef>
+        </p:style>
+      </p:cxnSp>
+      <p:cxnSp>
+        <p:nvCxnSpPr>
+          <p:cNvPr id="56" name="Straight Arrow Connector 55">
+            <a:extLst>
+              <a:ext uri="{FF2B5EF4-FFF2-40B4-BE49-F238E27FC236}">
+                <a16:creationId xmlns:a16="http://schemas.microsoft.com/office/drawing/2014/main" id="{4339A70A-35AA-4DB5-BF80-B859F71481A8}"/>
+              </a:ext>
+            </a:extLst>
+          </p:cNvPr>
+          <p:cNvCxnSpPr>
+            <a:cxnSpLocks/>
+            <a:stCxn id="15" idx="2"/>
+            <a:endCxn id="17" idx="0"/>
+          </p:cNvCxnSpPr>
+          <p:nvPr/>
+        </p:nvCxnSpPr>
+        <p:spPr>
+          <a:xfrm>
+            <a:off x="8427720" y="5686822"/>
+            <a:ext cx="1341120" cy="432217"/>
+          </a:xfrm>
+          <a:prstGeom prst="straightConnector1">
+            <a:avLst/>
+          </a:prstGeom>
+          <a:ln>
+            <a:tailEnd type="triangle"/>
+          </a:ln>
+        </p:spPr>
+        <p:style>
+          <a:lnRef idx="1">
+            <a:schemeClr val="accent1"/>
+          </a:lnRef>
+          <a:fillRef idx="0">
+            <a:schemeClr val="accent1"/>
+          </a:fillRef>
+          <a:effectRef idx="0">
+            <a:schemeClr val="accent1"/>
+          </a:effectRef>
+          <a:fontRef idx="minor">
+            <a:schemeClr val="tx1"/>
+          </a:fontRef>
+        </p:style>
+      </p:cxnSp>
     </p:spTree>
     <p:extLst>
       <p:ext uri="{BB962C8B-B14F-4D97-AF65-F5344CB8AC3E}">

</xml_diff>